<commit_message>
all code done except bayes feature reduction
needs cleaning up
</commit_message>
<xml_diff>
--- a/presentations/algorithm_overview.pptx
+++ b/presentations/algorithm_overview.pptx
@@ -316,7 +316,7 @@
           <a:p>
             <a:fld id="{04BDABAD-20ED-488D-B4FF-EA3611E5B067}" type="datetimeFigureOut">
               <a:rPr lang="en-US" smtClean="0"/>
-              <a:t>8/3/2017</a:t>
+              <a:t>8/9/2017</a:t>
             </a:fld>
             <a:endParaRPr lang="en-US"/>
           </a:p>
@@ -2577,7 +2577,7 @@
           <a:p>
             <a:fld id="{C0A46B16-8F7A-4D6F-8C0F-6A16AA8AE1CA}" type="datetimeFigureOut">
               <a:rPr lang="en-US" smtClean="0"/>
-              <a:t>8/3/2017</a:t>
+              <a:t>8/9/2017</a:t>
             </a:fld>
             <a:endParaRPr lang="en-US"/>
           </a:p>
@@ -2747,7 +2747,7 @@
           <a:p>
             <a:fld id="{C0A46B16-8F7A-4D6F-8C0F-6A16AA8AE1CA}" type="datetimeFigureOut">
               <a:rPr lang="en-US" smtClean="0"/>
-              <a:t>8/3/2017</a:t>
+              <a:t>8/9/2017</a:t>
             </a:fld>
             <a:endParaRPr lang="en-US"/>
           </a:p>
@@ -2927,7 +2927,7 @@
           <a:p>
             <a:fld id="{C0A46B16-8F7A-4D6F-8C0F-6A16AA8AE1CA}" type="datetimeFigureOut">
               <a:rPr lang="en-US" smtClean="0"/>
-              <a:t>8/3/2017</a:t>
+              <a:t>8/9/2017</a:t>
             </a:fld>
             <a:endParaRPr lang="en-US"/>
           </a:p>
@@ -3097,7 +3097,7 @@
           <a:p>
             <a:fld id="{C0A46B16-8F7A-4D6F-8C0F-6A16AA8AE1CA}" type="datetimeFigureOut">
               <a:rPr lang="en-US" smtClean="0"/>
-              <a:t>8/3/2017</a:t>
+              <a:t>8/9/2017</a:t>
             </a:fld>
             <a:endParaRPr lang="en-US"/>
           </a:p>
@@ -3343,7 +3343,7 @@
           <a:p>
             <a:fld id="{C0A46B16-8F7A-4D6F-8C0F-6A16AA8AE1CA}" type="datetimeFigureOut">
               <a:rPr lang="en-US" smtClean="0"/>
-              <a:t>8/3/2017</a:t>
+              <a:t>8/9/2017</a:t>
             </a:fld>
             <a:endParaRPr lang="en-US"/>
           </a:p>
@@ -3575,7 +3575,7 @@
           <a:p>
             <a:fld id="{C0A46B16-8F7A-4D6F-8C0F-6A16AA8AE1CA}" type="datetimeFigureOut">
               <a:rPr lang="en-US" smtClean="0"/>
-              <a:t>8/3/2017</a:t>
+              <a:t>8/9/2017</a:t>
             </a:fld>
             <a:endParaRPr lang="en-US"/>
           </a:p>
@@ -3942,7 +3942,7 @@
           <a:p>
             <a:fld id="{C0A46B16-8F7A-4D6F-8C0F-6A16AA8AE1CA}" type="datetimeFigureOut">
               <a:rPr lang="en-US" smtClean="0"/>
-              <a:t>8/3/2017</a:t>
+              <a:t>8/9/2017</a:t>
             </a:fld>
             <a:endParaRPr lang="en-US"/>
           </a:p>
@@ -4060,7 +4060,7 @@
           <a:p>
             <a:fld id="{C0A46B16-8F7A-4D6F-8C0F-6A16AA8AE1CA}" type="datetimeFigureOut">
               <a:rPr lang="en-US" smtClean="0"/>
-              <a:t>8/3/2017</a:t>
+              <a:t>8/9/2017</a:t>
             </a:fld>
             <a:endParaRPr lang="en-US"/>
           </a:p>
@@ -4155,7 +4155,7 @@
           <a:p>
             <a:fld id="{C0A46B16-8F7A-4D6F-8C0F-6A16AA8AE1CA}" type="datetimeFigureOut">
               <a:rPr lang="en-US" smtClean="0"/>
-              <a:t>8/3/2017</a:t>
+              <a:t>8/9/2017</a:t>
             </a:fld>
             <a:endParaRPr lang="en-US"/>
           </a:p>
@@ -4432,7 +4432,7 @@
           <a:p>
             <a:fld id="{C0A46B16-8F7A-4D6F-8C0F-6A16AA8AE1CA}" type="datetimeFigureOut">
               <a:rPr lang="en-US" smtClean="0"/>
-              <a:t>8/3/2017</a:t>
+              <a:t>8/9/2017</a:t>
             </a:fld>
             <a:endParaRPr lang="en-US"/>
           </a:p>
@@ -4685,7 +4685,7 @@
           <a:p>
             <a:fld id="{C0A46B16-8F7A-4D6F-8C0F-6A16AA8AE1CA}" type="datetimeFigureOut">
               <a:rPr lang="en-US" smtClean="0"/>
-              <a:t>8/3/2017</a:t>
+              <a:t>8/9/2017</a:t>
             </a:fld>
             <a:endParaRPr lang="en-US"/>
           </a:p>
@@ -4898,7 +4898,7 @@
           <a:p>
             <a:fld id="{C0A46B16-8F7A-4D6F-8C0F-6A16AA8AE1CA}" type="datetimeFigureOut">
               <a:rPr lang="en-US" smtClean="0"/>
-              <a:t>8/3/2017</a:t>
+              <a:t>8/9/2017</a:t>
             </a:fld>
             <a:endParaRPr lang="en-US"/>
           </a:p>
@@ -24065,6 +24065,58 @@
           </a:prstGeom>
         </p:spPr>
       </p:pic>
+      <p:sp>
+        <p:nvSpPr>
+          <p:cNvPr id="4" name="TextBox 3"/>
+          <p:cNvSpPr txBox="1"/>
+          <p:nvPr/>
+        </p:nvSpPr>
+        <p:spPr>
+          <a:xfrm>
+            <a:off x="5282442" y="1486020"/>
+            <a:ext cx="1203666" cy="646331"/>
+          </a:xfrm>
+          <a:prstGeom prst="rect">
+            <a:avLst/>
+          </a:prstGeom>
+          <a:noFill/>
+        </p:spPr>
+        <p:txBody>
+          <a:bodyPr wrap="square" rtlCol="0">
+            <a:spAutoFit/>
+          </a:bodyPr>
+          <a:lstStyle/>
+          <a:p>
+            <a:r>
+              <a:rPr lang="en-US" dirty="0" smtClean="0">
+                <a:solidFill>
+                  <a:srgbClr val="0070C0"/>
+                </a:solidFill>
+              </a:rPr>
+              <a:t>Blue</a:t>
+            </a:r>
+            <a:r>
+              <a:rPr lang="en-US" dirty="0" smtClean="0"/>
+              <a:t> = CD4</a:t>
+            </a:r>
+          </a:p>
+          <a:p>
+            <a:r>
+              <a:rPr lang="en-US" dirty="0" smtClean="0">
+                <a:solidFill>
+                  <a:srgbClr val="FF0000"/>
+                </a:solidFill>
+              </a:rPr>
+              <a:t>Red</a:t>
+            </a:r>
+            <a:r>
+              <a:rPr lang="en-US" dirty="0" smtClean="0"/>
+              <a:t>  = CD8</a:t>
+            </a:r>
+            <a:endParaRPr lang="en-US" dirty="0"/>
+          </a:p>
+        </p:txBody>
+      </p:sp>
     </p:spTree>
     <p:extLst>
       <p:ext uri="{BB962C8B-B14F-4D97-AF65-F5344CB8AC3E}">

</xml_diff>

<commit_message>
close to done the core
</commit_message>
<xml_diff>
--- a/presentations/algorithm_overview.pptx
+++ b/presentations/algorithm_overview.pptx
@@ -316,7 +316,7 @@
           <a:p>
             <a:fld id="{04BDABAD-20ED-488D-B4FF-EA3611E5B067}" type="datetimeFigureOut">
               <a:rPr lang="en-US" smtClean="0"/>
-              <a:t>8/9/2017</a:t>
+              <a:t>8/22/2017</a:t>
             </a:fld>
             <a:endParaRPr lang="en-US"/>
           </a:p>
@@ -2577,7 +2577,7 @@
           <a:p>
             <a:fld id="{C0A46B16-8F7A-4D6F-8C0F-6A16AA8AE1CA}" type="datetimeFigureOut">
               <a:rPr lang="en-US" smtClean="0"/>
-              <a:t>8/9/2017</a:t>
+              <a:t>8/22/2017</a:t>
             </a:fld>
             <a:endParaRPr lang="en-US"/>
           </a:p>
@@ -2747,7 +2747,7 @@
           <a:p>
             <a:fld id="{C0A46B16-8F7A-4D6F-8C0F-6A16AA8AE1CA}" type="datetimeFigureOut">
               <a:rPr lang="en-US" smtClean="0"/>
-              <a:t>8/9/2017</a:t>
+              <a:t>8/22/2017</a:t>
             </a:fld>
             <a:endParaRPr lang="en-US"/>
           </a:p>
@@ -2927,7 +2927,7 @@
           <a:p>
             <a:fld id="{C0A46B16-8F7A-4D6F-8C0F-6A16AA8AE1CA}" type="datetimeFigureOut">
               <a:rPr lang="en-US" smtClean="0"/>
-              <a:t>8/9/2017</a:t>
+              <a:t>8/22/2017</a:t>
             </a:fld>
             <a:endParaRPr lang="en-US"/>
           </a:p>
@@ -3097,7 +3097,7 @@
           <a:p>
             <a:fld id="{C0A46B16-8F7A-4D6F-8C0F-6A16AA8AE1CA}" type="datetimeFigureOut">
               <a:rPr lang="en-US" smtClean="0"/>
-              <a:t>8/9/2017</a:t>
+              <a:t>8/22/2017</a:t>
             </a:fld>
             <a:endParaRPr lang="en-US"/>
           </a:p>
@@ -3343,7 +3343,7 @@
           <a:p>
             <a:fld id="{C0A46B16-8F7A-4D6F-8C0F-6A16AA8AE1CA}" type="datetimeFigureOut">
               <a:rPr lang="en-US" smtClean="0"/>
-              <a:t>8/9/2017</a:t>
+              <a:t>8/22/2017</a:t>
             </a:fld>
             <a:endParaRPr lang="en-US"/>
           </a:p>
@@ -3575,7 +3575,7 @@
           <a:p>
             <a:fld id="{C0A46B16-8F7A-4D6F-8C0F-6A16AA8AE1CA}" type="datetimeFigureOut">
               <a:rPr lang="en-US" smtClean="0"/>
-              <a:t>8/9/2017</a:t>
+              <a:t>8/22/2017</a:t>
             </a:fld>
             <a:endParaRPr lang="en-US"/>
           </a:p>
@@ -3942,7 +3942,7 @@
           <a:p>
             <a:fld id="{C0A46B16-8F7A-4D6F-8C0F-6A16AA8AE1CA}" type="datetimeFigureOut">
               <a:rPr lang="en-US" smtClean="0"/>
-              <a:t>8/9/2017</a:t>
+              <a:t>8/22/2017</a:t>
             </a:fld>
             <a:endParaRPr lang="en-US"/>
           </a:p>
@@ -4060,7 +4060,7 @@
           <a:p>
             <a:fld id="{C0A46B16-8F7A-4D6F-8C0F-6A16AA8AE1CA}" type="datetimeFigureOut">
               <a:rPr lang="en-US" smtClean="0"/>
-              <a:t>8/9/2017</a:t>
+              <a:t>8/22/2017</a:t>
             </a:fld>
             <a:endParaRPr lang="en-US"/>
           </a:p>
@@ -4155,7 +4155,7 @@
           <a:p>
             <a:fld id="{C0A46B16-8F7A-4D6F-8C0F-6A16AA8AE1CA}" type="datetimeFigureOut">
               <a:rPr lang="en-US" smtClean="0"/>
-              <a:t>8/9/2017</a:t>
+              <a:t>8/22/2017</a:t>
             </a:fld>
             <a:endParaRPr lang="en-US"/>
           </a:p>
@@ -4432,7 +4432,7 @@
           <a:p>
             <a:fld id="{C0A46B16-8F7A-4D6F-8C0F-6A16AA8AE1CA}" type="datetimeFigureOut">
               <a:rPr lang="en-US" smtClean="0"/>
-              <a:t>8/9/2017</a:t>
+              <a:t>8/22/2017</a:t>
             </a:fld>
             <a:endParaRPr lang="en-US"/>
           </a:p>
@@ -4685,7 +4685,7 @@
           <a:p>
             <a:fld id="{C0A46B16-8F7A-4D6F-8C0F-6A16AA8AE1CA}" type="datetimeFigureOut">
               <a:rPr lang="en-US" smtClean="0"/>
-              <a:t>8/9/2017</a:t>
+              <a:t>8/22/2017</a:t>
             </a:fld>
             <a:endParaRPr lang="en-US"/>
           </a:p>
@@ -4898,7 +4898,7 @@
           <a:p>
             <a:fld id="{C0A46B16-8F7A-4D6F-8C0F-6A16AA8AE1CA}" type="datetimeFigureOut">
               <a:rPr lang="en-US" smtClean="0"/>
-              <a:t>8/9/2017</a:t>
+              <a:t>8/22/2017</a:t>
             </a:fld>
             <a:endParaRPr lang="en-US"/>
           </a:p>
@@ -22786,15 +22786,14 @@
         <p:nvCxnSpPr>
           <p:cNvPr id="9" name="Straight Arrow Connector 8"/>
           <p:cNvCxnSpPr>
-            <a:stCxn id="4" idx="3"/>
             <a:endCxn id="7" idx="1"/>
           </p:cNvCxnSpPr>
           <p:nvPr/>
         </p:nvCxnSpPr>
         <p:spPr>
-          <a:xfrm flipV="1">
-            <a:off x="2797734" y="2838127"/>
-            <a:ext cx="704002" cy="1"/>
+          <a:xfrm>
+            <a:off x="3142796" y="2838126"/>
+            <a:ext cx="358940" cy="1"/>
           </a:xfrm>
           <a:prstGeom prst="straightConnector1">
             <a:avLst/>
@@ -23362,6 +23361,132 @@
               <a:solidFill>
                 <a:schemeClr val="bg1">
                   <a:lumMod val="50000"/>
+                </a:schemeClr>
+              </a:solidFill>
+            </a:endParaRPr>
+          </a:p>
+        </p:txBody>
+      </p:sp>
+      <p:sp>
+        <p:nvSpPr>
+          <p:cNvPr id="3" name="TextBox 2"/>
+          <p:cNvSpPr txBox="1"/>
+          <p:nvPr/>
+        </p:nvSpPr>
+        <p:spPr>
+          <a:xfrm>
+            <a:off x="2564262" y="2367550"/>
+            <a:ext cx="704002" cy="369332"/>
+          </a:xfrm>
+          <a:prstGeom prst="rect">
+            <a:avLst/>
+          </a:prstGeom>
+          <a:noFill/>
+        </p:spPr>
+        <p:txBody>
+          <a:bodyPr wrap="square" rtlCol="0">
+            <a:spAutoFit/>
+          </a:bodyPr>
+          <a:lstStyle/>
+          <a:p>
+            <a:r>
+              <a:rPr lang="en-US" dirty="0" smtClean="0">
+                <a:solidFill>
+                  <a:schemeClr val="accent1">
+                    <a:lumMod val="75000"/>
+                  </a:schemeClr>
+                </a:solidFill>
+              </a:rPr>
+              <a:t>CDR3</a:t>
+            </a:r>
+            <a:endParaRPr lang="en-US" dirty="0">
+              <a:solidFill>
+                <a:schemeClr val="accent1">
+                  <a:lumMod val="75000"/>
+                </a:schemeClr>
+              </a:solidFill>
+            </a:endParaRPr>
+          </a:p>
+        </p:txBody>
+      </p:sp>
+      <p:sp>
+        <p:nvSpPr>
+          <p:cNvPr id="20" name="TextBox 19"/>
+          <p:cNvSpPr txBox="1"/>
+          <p:nvPr/>
+        </p:nvSpPr>
+        <p:spPr>
+          <a:xfrm>
+            <a:off x="2330790" y="2642678"/>
+            <a:ext cx="704002" cy="369332"/>
+          </a:xfrm>
+          <a:prstGeom prst="rect">
+            <a:avLst/>
+          </a:prstGeom>
+          <a:noFill/>
+        </p:spPr>
+        <p:txBody>
+          <a:bodyPr wrap="square" rtlCol="0">
+            <a:spAutoFit/>
+          </a:bodyPr>
+          <a:lstStyle/>
+          <a:p>
+            <a:r>
+              <a:rPr lang="en-US" dirty="0" smtClean="0">
+                <a:solidFill>
+                  <a:schemeClr val="accent1">
+                    <a:lumMod val="75000"/>
+                  </a:schemeClr>
+                </a:solidFill>
+              </a:rPr>
+              <a:t>CDR2</a:t>
+            </a:r>
+            <a:endParaRPr lang="en-US" dirty="0">
+              <a:solidFill>
+                <a:schemeClr val="accent1">
+                  <a:lumMod val="75000"/>
+                </a:schemeClr>
+              </a:solidFill>
+            </a:endParaRPr>
+          </a:p>
+        </p:txBody>
+      </p:sp>
+      <p:sp>
+        <p:nvSpPr>
+          <p:cNvPr id="21" name="TextBox 20"/>
+          <p:cNvSpPr txBox="1"/>
+          <p:nvPr/>
+        </p:nvSpPr>
+        <p:spPr>
+          <a:xfrm>
+            <a:off x="2330790" y="2917806"/>
+            <a:ext cx="704002" cy="369332"/>
+          </a:xfrm>
+          <a:prstGeom prst="rect">
+            <a:avLst/>
+          </a:prstGeom>
+          <a:noFill/>
+        </p:spPr>
+        <p:txBody>
+          <a:bodyPr wrap="square" rtlCol="0">
+            <a:spAutoFit/>
+          </a:bodyPr>
+          <a:lstStyle/>
+          <a:p>
+            <a:r>
+              <a:rPr lang="en-US" dirty="0" smtClean="0">
+                <a:solidFill>
+                  <a:schemeClr val="accent1">
+                    <a:lumMod val="75000"/>
+                  </a:schemeClr>
+                </a:solidFill>
+              </a:rPr>
+              <a:t>CDR1</a:t>
+            </a:r>
+            <a:endParaRPr lang="en-US" dirty="0">
+              <a:solidFill>
+                <a:schemeClr val="accent1">
+                  <a:lumMod val="75000"/>
                 </a:schemeClr>
               </a:solidFill>
             </a:endParaRPr>

</xml_diff>